<commit_message>
Fixed issue #49 (consistent documentation standard): All figures satisfy the documentation standard now.
</commit_message>
<xml_diff>
--- a/racr/documentation/figures/analyse-synthesise-cycle.pptx
+++ b/racr/documentation/figures/analyse-synthesise-cycle.pptx
@@ -288,7 +288,7 @@
           <a:p>
             <a:fld id="{4C67DC64-DD91-EF40-BCE6-499D218257AE}" type="datetimeFigureOut">
               <a:rPr lang="de-DE" smtClean="0"/>
-              <a:t>22/12/2012</a:t>
+              <a:t>03/02/16</a:t>
             </a:fld>
             <a:endParaRPr lang="de-DE"/>
           </a:p>
@@ -330,7 +330,7 @@
           <a:p>
             <a:fld id="{E08573F6-1E73-824F-AE8E-F57FD74ABB95}" type="slidenum">
               <a:rPr lang="de-DE" smtClean="0"/>
-              <a:t>‹Nr.›</a:t>
+              <a:t>‹#›</a:t>
             </a:fld>
             <a:endParaRPr lang="de-DE"/>
           </a:p>
@@ -458,7 +458,7 @@
           <a:p>
             <a:fld id="{4C67DC64-DD91-EF40-BCE6-499D218257AE}" type="datetimeFigureOut">
               <a:rPr lang="de-DE" smtClean="0"/>
-              <a:t>22/12/2012</a:t>
+              <a:t>03/02/16</a:t>
             </a:fld>
             <a:endParaRPr lang="de-DE"/>
           </a:p>
@@ -500,7 +500,7 @@
           <a:p>
             <a:fld id="{E08573F6-1E73-824F-AE8E-F57FD74ABB95}" type="slidenum">
               <a:rPr lang="de-DE" smtClean="0"/>
-              <a:t>‹Nr.›</a:t>
+              <a:t>‹#›</a:t>
             </a:fld>
             <a:endParaRPr lang="de-DE"/>
           </a:p>
@@ -638,7 +638,7 @@
           <a:p>
             <a:fld id="{4C67DC64-DD91-EF40-BCE6-499D218257AE}" type="datetimeFigureOut">
               <a:rPr lang="de-DE" smtClean="0"/>
-              <a:t>22/12/2012</a:t>
+              <a:t>03/02/16</a:t>
             </a:fld>
             <a:endParaRPr lang="de-DE"/>
           </a:p>
@@ -680,7 +680,7 @@
           <a:p>
             <a:fld id="{E08573F6-1E73-824F-AE8E-F57FD74ABB95}" type="slidenum">
               <a:rPr lang="de-DE" smtClean="0"/>
-              <a:t>‹Nr.›</a:t>
+              <a:t>‹#›</a:t>
             </a:fld>
             <a:endParaRPr lang="de-DE"/>
           </a:p>
@@ -808,7 +808,7 @@
           <a:p>
             <a:fld id="{4C67DC64-DD91-EF40-BCE6-499D218257AE}" type="datetimeFigureOut">
               <a:rPr lang="de-DE" smtClean="0"/>
-              <a:t>22/12/2012</a:t>
+              <a:t>03/02/16</a:t>
             </a:fld>
             <a:endParaRPr lang="de-DE"/>
           </a:p>
@@ -850,7 +850,7 @@
           <a:p>
             <a:fld id="{E08573F6-1E73-824F-AE8E-F57FD74ABB95}" type="slidenum">
               <a:rPr lang="de-DE" smtClean="0"/>
-              <a:t>‹Nr.›</a:t>
+              <a:t>‹#›</a:t>
             </a:fld>
             <a:endParaRPr lang="de-DE"/>
           </a:p>
@@ -1054,7 +1054,7 @@
           <a:p>
             <a:fld id="{4C67DC64-DD91-EF40-BCE6-499D218257AE}" type="datetimeFigureOut">
               <a:rPr lang="de-DE" smtClean="0"/>
-              <a:t>22/12/2012</a:t>
+              <a:t>03/02/16</a:t>
             </a:fld>
             <a:endParaRPr lang="de-DE"/>
           </a:p>
@@ -1096,7 +1096,7 @@
           <a:p>
             <a:fld id="{E08573F6-1E73-824F-AE8E-F57FD74ABB95}" type="slidenum">
               <a:rPr lang="de-DE" smtClean="0"/>
-              <a:t>‹Nr.›</a:t>
+              <a:t>‹#›</a:t>
             </a:fld>
             <a:endParaRPr lang="de-DE"/>
           </a:p>
@@ -1342,7 +1342,7 @@
           <a:p>
             <a:fld id="{4C67DC64-DD91-EF40-BCE6-499D218257AE}" type="datetimeFigureOut">
               <a:rPr lang="de-DE" smtClean="0"/>
-              <a:t>22/12/2012</a:t>
+              <a:t>03/02/16</a:t>
             </a:fld>
             <a:endParaRPr lang="de-DE"/>
           </a:p>
@@ -1384,7 +1384,7 @@
           <a:p>
             <a:fld id="{E08573F6-1E73-824F-AE8E-F57FD74ABB95}" type="slidenum">
               <a:rPr lang="de-DE" smtClean="0"/>
-              <a:t>‹Nr.›</a:t>
+              <a:t>‹#›</a:t>
             </a:fld>
             <a:endParaRPr lang="de-DE"/>
           </a:p>
@@ -1764,7 +1764,7 @@
           <a:p>
             <a:fld id="{4C67DC64-DD91-EF40-BCE6-499D218257AE}" type="datetimeFigureOut">
               <a:rPr lang="de-DE" smtClean="0"/>
-              <a:t>22/12/2012</a:t>
+              <a:t>03/02/16</a:t>
             </a:fld>
             <a:endParaRPr lang="de-DE"/>
           </a:p>
@@ -1806,7 +1806,7 @@
           <a:p>
             <a:fld id="{E08573F6-1E73-824F-AE8E-F57FD74ABB95}" type="slidenum">
               <a:rPr lang="de-DE" smtClean="0"/>
-              <a:t>‹Nr.›</a:t>
+              <a:t>‹#›</a:t>
             </a:fld>
             <a:endParaRPr lang="de-DE"/>
           </a:p>
@@ -1882,7 +1882,7 @@
           <a:p>
             <a:fld id="{4C67DC64-DD91-EF40-BCE6-499D218257AE}" type="datetimeFigureOut">
               <a:rPr lang="de-DE" smtClean="0"/>
-              <a:t>22/12/2012</a:t>
+              <a:t>03/02/16</a:t>
             </a:fld>
             <a:endParaRPr lang="de-DE"/>
           </a:p>
@@ -1924,7 +1924,7 @@
           <a:p>
             <a:fld id="{E08573F6-1E73-824F-AE8E-F57FD74ABB95}" type="slidenum">
               <a:rPr lang="de-DE" smtClean="0"/>
-              <a:t>‹Nr.›</a:t>
+              <a:t>‹#›</a:t>
             </a:fld>
             <a:endParaRPr lang="de-DE"/>
           </a:p>
@@ -1977,7 +1977,7 @@
           <a:p>
             <a:fld id="{4C67DC64-DD91-EF40-BCE6-499D218257AE}" type="datetimeFigureOut">
               <a:rPr lang="de-DE" smtClean="0"/>
-              <a:t>22/12/2012</a:t>
+              <a:t>03/02/16</a:t>
             </a:fld>
             <a:endParaRPr lang="de-DE"/>
           </a:p>
@@ -2019,7 +2019,7 @@
           <a:p>
             <a:fld id="{E08573F6-1E73-824F-AE8E-F57FD74ABB95}" type="slidenum">
               <a:rPr lang="de-DE" smtClean="0"/>
-              <a:t>‹Nr.›</a:t>
+              <a:t>‹#›</a:t>
             </a:fld>
             <a:endParaRPr lang="de-DE"/>
           </a:p>
@@ -2254,7 +2254,7 @@
           <a:p>
             <a:fld id="{4C67DC64-DD91-EF40-BCE6-499D218257AE}" type="datetimeFigureOut">
               <a:rPr lang="de-DE" smtClean="0"/>
-              <a:t>22/12/2012</a:t>
+              <a:t>03/02/16</a:t>
             </a:fld>
             <a:endParaRPr lang="de-DE"/>
           </a:p>
@@ -2296,7 +2296,7 @@
           <a:p>
             <a:fld id="{E08573F6-1E73-824F-AE8E-F57FD74ABB95}" type="slidenum">
               <a:rPr lang="de-DE" smtClean="0"/>
-              <a:t>‹Nr.›</a:t>
+              <a:t>‹#›</a:t>
             </a:fld>
             <a:endParaRPr lang="de-DE"/>
           </a:p>
@@ -2507,7 +2507,7 @@
           <a:p>
             <a:fld id="{4C67DC64-DD91-EF40-BCE6-499D218257AE}" type="datetimeFigureOut">
               <a:rPr lang="de-DE" smtClean="0"/>
-              <a:t>22/12/2012</a:t>
+              <a:t>03/02/16</a:t>
             </a:fld>
             <a:endParaRPr lang="de-DE"/>
           </a:p>
@@ -2549,7 +2549,7 @@
           <a:p>
             <a:fld id="{E08573F6-1E73-824F-AE8E-F57FD74ABB95}" type="slidenum">
               <a:rPr lang="de-DE" smtClean="0"/>
-              <a:t>‹Nr.›</a:t>
+              <a:t>‹#›</a:t>
             </a:fld>
             <a:endParaRPr lang="de-DE"/>
           </a:p>
@@ -2720,7 +2720,7 @@
           <a:p>
             <a:fld id="{4C67DC64-DD91-EF40-BCE6-499D218257AE}" type="datetimeFigureOut">
               <a:rPr lang="de-DE" smtClean="0"/>
-              <a:t>22/12/2012</a:t>
+              <a:t>03/02/16</a:t>
             </a:fld>
             <a:endParaRPr lang="de-DE"/>
           </a:p>
@@ -2798,7 +2798,7 @@
           <a:p>
             <a:fld id="{E08573F6-1E73-824F-AE8E-F57FD74ABB95}" type="slidenum">
               <a:rPr lang="de-DE" smtClean="0"/>
-              <a:t>‹Nr.›</a:t>
+              <a:t>‹#›</a:t>
             </a:fld>
             <a:endParaRPr lang="de-DE"/>
           </a:p>
@@ -3133,7 +3133,6 @@
               <a:defRPr/>
             </a:pPr>
             <a:endParaRPr lang="de-DE">
-              <a:latin typeface="Microsoft Sans Serif" pitchFamily="34" charset="0"/>
               <a:ea typeface="+mn-ea"/>
               <a:cs typeface="+mn-cs"/>
             </a:endParaRPr>
@@ -3480,21 +3479,28 @@
               <a:defRPr/>
             </a:pPr>
             <a:r>
+              <a:rPr lang="en-US" sz="1200" b="1" dirty="0">
+                <a:solidFill>
+                  <a:srgbClr val="000000"/>
+                </a:solidFill>
+                <a:cs typeface="Arial"/>
+              </a:rPr>
+              <a:t>a</a:t>
+            </a:r>
+            <a:r>
               <a:rPr lang="en-US" sz="1200" b="1" dirty="0" smtClean="0">
                 <a:solidFill>
                   <a:srgbClr val="000000"/>
                 </a:solidFill>
-                <a:latin typeface="Arial"/>
                 <a:ea typeface="+mn-ea"/>
                 <a:cs typeface="Arial"/>
               </a:rPr>
-              <a:t>Apply Rewrite</a:t>
+              <a:t>pply rewrite</a:t>
             </a:r>
             <a:endParaRPr lang="en-US" sz="1200" b="1" kern="0" dirty="0">
               <a:solidFill>
                 <a:srgbClr val="000000"/>
               </a:solidFill>
-              <a:latin typeface="Arial"/>
               <a:ea typeface="+mn-ea"/>
               <a:cs typeface="Arial"/>
             </a:endParaRPr>
@@ -3619,21 +3625,28 @@
               <a:defRPr/>
             </a:pPr>
             <a:r>
+              <a:rPr lang="en-US" sz="1200" b="1" dirty="0">
+                <a:solidFill>
+                  <a:srgbClr val="000000"/>
+                </a:solidFill>
+                <a:cs typeface="Arial"/>
+              </a:rPr>
+              <a:t>a</a:t>
+            </a:r>
+            <a:r>
               <a:rPr lang="en-US" sz="1200" b="1" dirty="0" smtClean="0">
                 <a:solidFill>
                   <a:srgbClr val="000000"/>
                 </a:solidFill>
-                <a:latin typeface="Arial"/>
                 <a:ea typeface="+mn-ea"/>
                 <a:cs typeface="Arial"/>
               </a:rPr>
-              <a:t>Apply Rewrite</a:t>
+              <a:t>pply rewrite</a:t>
             </a:r>
             <a:endParaRPr lang="en-US" sz="1200" b="1" kern="0" dirty="0">
               <a:solidFill>
                 <a:srgbClr val="000000"/>
               </a:solidFill>
-              <a:latin typeface="Arial"/>
               <a:ea typeface="+mn-ea"/>
               <a:cs typeface="Arial"/>
             </a:endParaRPr>
@@ -3771,21 +3784,28 @@
               <a:defRPr/>
             </a:pPr>
             <a:r>
+              <a:rPr lang="en-US" sz="1200" b="1" dirty="0">
+                <a:solidFill>
+                  <a:srgbClr val="000000"/>
+                </a:solidFill>
+                <a:cs typeface="Arial"/>
+              </a:rPr>
+              <a:t>r</a:t>
+            </a:r>
+            <a:r>
               <a:rPr lang="en-US" sz="1200" b="1" dirty="0" smtClean="0">
                 <a:solidFill>
                   <a:srgbClr val="000000"/>
                 </a:solidFill>
-                <a:latin typeface="Arial"/>
                 <a:ea typeface="+mn-ea"/>
                 <a:cs typeface="Arial"/>
               </a:rPr>
-              <a:t>Rewrite Rule</a:t>
+              <a:t>ewrite rule</a:t>
             </a:r>
             <a:endParaRPr lang="en-US" sz="1200" b="1" kern="0" dirty="0">
               <a:solidFill>
                 <a:srgbClr val="000000"/>
               </a:solidFill>
-              <a:latin typeface="Arial"/>
               <a:ea typeface="+mn-ea"/>
               <a:cs typeface="Arial"/>
             </a:endParaRPr>
@@ -3900,7 +3920,6 @@
               <a:solidFill>
                 <a:schemeClr val="tx1"/>
               </a:solidFill>
-              <a:latin typeface="Microsoft Sans Serif" pitchFamily="34" charset="0"/>
               <a:ea typeface="+mn-ea"/>
               <a:cs typeface="+mn-cs"/>
             </a:endParaRPr>
@@ -3982,7 +4001,6 @@
               <a:solidFill>
                 <a:schemeClr val="tx1"/>
               </a:solidFill>
-              <a:latin typeface="Microsoft Sans Serif" pitchFamily="34" charset="0"/>
               <a:ea typeface="+mn-ea"/>
               <a:cs typeface="+mn-cs"/>
             </a:endParaRPr>
@@ -4028,7 +4046,6 @@
               <a:solidFill>
                 <a:schemeClr val="tx1"/>
               </a:solidFill>
-              <a:latin typeface="Microsoft Sans Serif" pitchFamily="34" charset="0"/>
               <a:ea typeface="+mn-ea"/>
               <a:cs typeface="+mn-cs"/>
             </a:endParaRPr>
@@ -4074,7 +4091,6 @@
               <a:solidFill>
                 <a:schemeClr val="tx1"/>
               </a:solidFill>
-              <a:latin typeface="Microsoft Sans Serif" pitchFamily="34" charset="0"/>
               <a:ea typeface="+mn-ea"/>
               <a:cs typeface="+mn-cs"/>
             </a:endParaRPr>
@@ -4120,7 +4136,6 @@
               <a:solidFill>
                 <a:schemeClr val="tx1"/>
               </a:solidFill>
-              <a:latin typeface="Microsoft Sans Serif" pitchFamily="34" charset="0"/>
               <a:ea typeface="+mn-ea"/>
               <a:cs typeface="+mn-cs"/>
             </a:endParaRPr>
@@ -4235,7 +4250,6 @@
               <a:solidFill>
                 <a:schemeClr val="tx1"/>
               </a:solidFill>
-              <a:latin typeface="Microsoft Sans Serif" pitchFamily="34" charset="0"/>
               <a:ea typeface="+mn-ea"/>
               <a:cs typeface="+mn-cs"/>
             </a:endParaRPr>
@@ -4317,7 +4331,6 @@
               <a:solidFill>
                 <a:schemeClr val="tx1"/>
               </a:solidFill>
-              <a:latin typeface="Microsoft Sans Serif" pitchFamily="34" charset="0"/>
               <a:ea typeface="+mn-ea"/>
               <a:cs typeface="+mn-cs"/>
             </a:endParaRPr>
@@ -4363,7 +4376,6 @@
               <a:solidFill>
                 <a:schemeClr val="tx1"/>
               </a:solidFill>
-              <a:latin typeface="Microsoft Sans Serif" pitchFamily="34" charset="0"/>
               <a:ea typeface="+mn-ea"/>
               <a:cs typeface="+mn-cs"/>
             </a:endParaRPr>
@@ -4409,7 +4421,6 @@
               <a:solidFill>
                 <a:schemeClr val="tx1"/>
               </a:solidFill>
-              <a:latin typeface="Microsoft Sans Serif" pitchFamily="34" charset="0"/>
               <a:ea typeface="+mn-ea"/>
               <a:cs typeface="+mn-cs"/>
             </a:endParaRPr>
@@ -4524,7 +4535,6 @@
               <a:solidFill>
                 <a:schemeClr val="tx1"/>
               </a:solidFill>
-              <a:latin typeface="Microsoft Sans Serif" pitchFamily="34" charset="0"/>
               <a:ea typeface="+mn-ea"/>
               <a:cs typeface="+mn-cs"/>
             </a:endParaRPr>
@@ -4606,7 +4616,6 @@
               <a:solidFill>
                 <a:schemeClr val="tx1"/>
               </a:solidFill>
-              <a:latin typeface="Microsoft Sans Serif" pitchFamily="34" charset="0"/>
               <a:ea typeface="+mn-ea"/>
               <a:cs typeface="+mn-cs"/>
             </a:endParaRPr>
@@ -4652,7 +4661,6 @@
               <a:solidFill>
                 <a:schemeClr val="tx1"/>
               </a:solidFill>
-              <a:latin typeface="Microsoft Sans Serif" pitchFamily="34" charset="0"/>
               <a:ea typeface="+mn-ea"/>
               <a:cs typeface="+mn-cs"/>
             </a:endParaRPr>
@@ -4698,7 +4706,6 @@
               <a:solidFill>
                 <a:schemeClr val="tx1"/>
               </a:solidFill>
-              <a:latin typeface="Microsoft Sans Serif" pitchFamily="34" charset="0"/>
               <a:ea typeface="+mn-ea"/>
               <a:cs typeface="+mn-cs"/>
             </a:endParaRPr>
@@ -4847,7 +4854,6 @@
               <a:solidFill>
                 <a:schemeClr val="tx1"/>
               </a:solidFill>
-              <a:latin typeface="Microsoft Sans Serif" pitchFamily="34" charset="0"/>
               <a:ea typeface="+mn-ea"/>
               <a:cs typeface="+mn-cs"/>
             </a:endParaRPr>
@@ -4893,7 +4899,6 @@
               <a:solidFill>
                 <a:schemeClr val="tx1"/>
               </a:solidFill>
-              <a:latin typeface="Microsoft Sans Serif" pitchFamily="34" charset="0"/>
               <a:ea typeface="+mn-ea"/>
               <a:cs typeface="+mn-cs"/>
             </a:endParaRPr>
@@ -4975,7 +4980,6 @@
               <a:solidFill>
                 <a:schemeClr val="tx1"/>
               </a:solidFill>
-              <a:latin typeface="Microsoft Sans Serif" pitchFamily="34" charset="0"/>
               <a:ea typeface="+mn-ea"/>
               <a:cs typeface="+mn-cs"/>
             </a:endParaRPr>
@@ -5021,7 +5025,6 @@
               <a:solidFill>
                 <a:schemeClr val="tx1"/>
               </a:solidFill>
-              <a:latin typeface="Microsoft Sans Serif" pitchFamily="34" charset="0"/>
               <a:ea typeface="+mn-ea"/>
               <a:cs typeface="+mn-cs"/>
             </a:endParaRPr>
@@ -5067,7 +5070,6 @@
               <a:solidFill>
                 <a:schemeClr val="tx1"/>
               </a:solidFill>
-              <a:latin typeface="Microsoft Sans Serif" pitchFamily="34" charset="0"/>
               <a:ea typeface="+mn-ea"/>
               <a:cs typeface="+mn-cs"/>
             </a:endParaRPr>
@@ -5216,7 +5218,6 @@
               <a:solidFill>
                 <a:schemeClr val="tx1"/>
               </a:solidFill>
-              <a:latin typeface="Microsoft Sans Serif" pitchFamily="34" charset="0"/>
               <a:ea typeface="+mn-ea"/>
               <a:cs typeface="+mn-cs"/>
             </a:endParaRPr>
@@ -5262,7 +5263,6 @@
               <a:solidFill>
                 <a:schemeClr val="tx1"/>
               </a:solidFill>
-              <a:latin typeface="Microsoft Sans Serif" pitchFamily="34" charset="0"/>
               <a:ea typeface="+mn-ea"/>
               <a:cs typeface="+mn-cs"/>
             </a:endParaRPr>
@@ -5344,7 +5344,6 @@
               <a:solidFill>
                 <a:schemeClr val="tx1"/>
               </a:solidFill>
-              <a:latin typeface="Microsoft Sans Serif" pitchFamily="34" charset="0"/>
               <a:ea typeface="+mn-ea"/>
               <a:cs typeface="+mn-cs"/>
             </a:endParaRPr>
@@ -5390,7 +5389,6 @@
               <a:solidFill>
                 <a:schemeClr val="tx1"/>
               </a:solidFill>
-              <a:latin typeface="Microsoft Sans Serif" pitchFamily="34" charset="0"/>
               <a:ea typeface="+mn-ea"/>
               <a:cs typeface="+mn-cs"/>
             </a:endParaRPr>
@@ -5436,7 +5434,6 @@
               <a:solidFill>
                 <a:schemeClr val="tx1"/>
               </a:solidFill>
-              <a:latin typeface="Microsoft Sans Serif" pitchFamily="34" charset="0"/>
               <a:ea typeface="+mn-ea"/>
               <a:cs typeface="+mn-cs"/>
             </a:endParaRPr>
@@ -5551,7 +5548,6 @@
               <a:solidFill>
                 <a:schemeClr val="tx1"/>
               </a:solidFill>
-              <a:latin typeface="Microsoft Sans Serif" pitchFamily="34" charset="0"/>
               <a:ea typeface="+mn-ea"/>
               <a:cs typeface="+mn-cs"/>
             </a:endParaRPr>
@@ -5666,7 +5662,6 @@
               <a:solidFill>
                 <a:schemeClr val="tx1"/>
               </a:solidFill>
-              <a:latin typeface="Microsoft Sans Serif" pitchFamily="34" charset="0"/>
               <a:ea typeface="+mn-ea"/>
               <a:cs typeface="+mn-cs"/>
             </a:endParaRPr>
@@ -5712,7 +5707,6 @@
               <a:solidFill>
                 <a:schemeClr val="tx1"/>
               </a:solidFill>
-              <a:latin typeface="Microsoft Sans Serif" pitchFamily="34" charset="0"/>
               <a:ea typeface="+mn-ea"/>
               <a:cs typeface="+mn-cs"/>
             </a:endParaRPr>
@@ -5794,7 +5788,6 @@
               <a:solidFill>
                 <a:schemeClr val="tx1"/>
               </a:solidFill>
-              <a:latin typeface="Microsoft Sans Serif" pitchFamily="34" charset="0"/>
               <a:ea typeface="+mn-ea"/>
               <a:cs typeface="+mn-cs"/>
             </a:endParaRPr>
@@ -5840,7 +5833,6 @@
               <a:solidFill>
                 <a:schemeClr val="tx1"/>
               </a:solidFill>
-              <a:latin typeface="Microsoft Sans Serif" pitchFamily="34" charset="0"/>
               <a:ea typeface="+mn-ea"/>
               <a:cs typeface="+mn-cs"/>
             </a:endParaRPr>
@@ -5886,7 +5878,6 @@
               <a:solidFill>
                 <a:schemeClr val="tx1"/>
               </a:solidFill>
-              <a:latin typeface="Microsoft Sans Serif" pitchFamily="34" charset="0"/>
               <a:ea typeface="+mn-ea"/>
               <a:cs typeface="+mn-cs"/>
             </a:endParaRPr>
@@ -6001,7 +5992,6 @@
               <a:solidFill>
                 <a:schemeClr val="tx1"/>
               </a:solidFill>
-              <a:latin typeface="Microsoft Sans Serif" pitchFamily="34" charset="0"/>
               <a:ea typeface="+mn-ea"/>
               <a:cs typeface="+mn-cs"/>
             </a:endParaRPr>
@@ -6116,7 +6106,6 @@
               <a:solidFill>
                 <a:schemeClr val="tx1"/>
               </a:solidFill>
-              <a:latin typeface="Microsoft Sans Serif" pitchFamily="34" charset="0"/>
               <a:ea typeface="+mn-ea"/>
               <a:cs typeface="+mn-cs"/>
             </a:endParaRPr>
@@ -6162,7 +6151,6 @@
               <a:solidFill>
                 <a:schemeClr val="tx1"/>
               </a:solidFill>
-              <a:latin typeface="Microsoft Sans Serif" pitchFamily="34" charset="0"/>
               <a:ea typeface="+mn-ea"/>
               <a:cs typeface="+mn-cs"/>
             </a:endParaRPr>
@@ -6208,7 +6196,6 @@
               <a:solidFill>
                 <a:schemeClr val="tx1"/>
               </a:solidFill>
-              <a:latin typeface="Microsoft Sans Serif" pitchFamily="34" charset="0"/>
               <a:ea typeface="+mn-ea"/>
               <a:cs typeface="+mn-cs"/>
             </a:endParaRPr>
@@ -6254,7 +6241,6 @@
               <a:solidFill>
                 <a:schemeClr val="tx1"/>
               </a:solidFill>
-              <a:latin typeface="Microsoft Sans Serif" pitchFamily="34" charset="0"/>
               <a:ea typeface="+mn-ea"/>
               <a:cs typeface="+mn-cs"/>
             </a:endParaRPr>
@@ -6369,7 +6355,6 @@
               <a:solidFill>
                 <a:schemeClr val="tx1"/>
               </a:solidFill>
-              <a:latin typeface="Microsoft Sans Serif" pitchFamily="34" charset="0"/>
               <a:ea typeface="+mn-ea"/>
               <a:cs typeface="+mn-cs"/>
             </a:endParaRPr>
@@ -6449,7 +6434,6 @@
               <a:solidFill>
                 <a:schemeClr val="tx1"/>
               </a:solidFill>
-              <a:latin typeface="Microsoft Sans Serif" pitchFamily="34" charset="0"/>
               <a:ea typeface="+mn-ea"/>
               <a:cs typeface="+mn-cs"/>
             </a:endParaRPr>
@@ -6648,14 +6632,25 @@
             <a:pPr algn="ctr"/>
             <a:r>
               <a:rPr lang="de-DE" sz="1200" b="1" dirty="0">
-                <a:solidFill>
-                  <a:schemeClr val="tx1"/>
-                </a:solidFill>
-                <a:latin typeface="Arial" charset="0"/>
                 <a:cs typeface="Arial" charset="0"/>
               </a:rPr>
-              <a:t>Time</a:t>
-            </a:r>
+              <a:t>t</a:t>
+            </a:r>
+            <a:r>
+              <a:rPr lang="de-DE" sz="1200" b="1" dirty="0" smtClean="0">
+                <a:solidFill>
+                  <a:schemeClr val="tx1"/>
+                </a:solidFill>
+                <a:cs typeface="Arial" charset="0"/>
+              </a:rPr>
+              <a:t>ime</a:t>
+            </a:r>
+            <a:endParaRPr lang="de-DE" sz="1200" b="1" dirty="0">
+              <a:solidFill>
+                <a:schemeClr val="tx1"/>
+              </a:solidFill>
+              <a:cs typeface="Arial" charset="0"/>
+            </a:endParaRPr>
           </a:p>
         </p:txBody>
       </p:sp>
@@ -6733,7 +6728,6 @@
               <a:solidFill>
                 <a:schemeClr val="tx1"/>
               </a:solidFill>
-              <a:latin typeface="Microsoft Sans Serif" pitchFamily="34" charset="0"/>
               <a:ea typeface="+mn-ea"/>
               <a:cs typeface="+mn-cs"/>
             </a:endParaRPr>
@@ -6814,7 +6808,6 @@
               <a:solidFill>
                 <a:schemeClr val="tx1"/>
               </a:solidFill>
-              <a:latin typeface="Microsoft Sans Serif" pitchFamily="34" charset="0"/>
               <a:ea typeface="+mn-ea"/>
               <a:cs typeface="+mn-cs"/>
             </a:endParaRPr>
@@ -6856,21 +6849,28 @@
               <a:defRPr/>
             </a:pPr>
             <a:r>
+              <a:rPr lang="en-US" sz="1200" b="1" dirty="0">
+                <a:solidFill>
+                  <a:srgbClr val="000000"/>
+                </a:solidFill>
+                <a:cs typeface="Arial"/>
+              </a:rPr>
+              <a:t>a</a:t>
+            </a:r>
+            <a:r>
               <a:rPr lang="en-US" sz="1200" b="1" dirty="0" smtClean="0">
                 <a:solidFill>
                   <a:srgbClr val="000000"/>
                 </a:solidFill>
-                <a:latin typeface="Arial"/>
                 <a:ea typeface="+mn-ea"/>
                 <a:cs typeface="Arial"/>
               </a:rPr>
-              <a:t>Apply Rewrite</a:t>
+              <a:t>pply rewrite</a:t>
             </a:r>
             <a:endParaRPr lang="en-US" sz="1200" b="1" kern="0" dirty="0">
               <a:solidFill>
                 <a:srgbClr val="000000"/>
               </a:solidFill>
-              <a:latin typeface="Arial"/>
               <a:ea typeface="+mn-ea"/>
               <a:cs typeface="Arial"/>
             </a:endParaRPr>
@@ -6887,8 +6887,8 @@
         </p:nvSpPr>
         <p:spPr bwMode="auto">
           <a:xfrm>
-            <a:off x="816007" y="2978150"/>
-            <a:ext cx="673036" cy="369332"/>
+            <a:off x="808268" y="2978150"/>
+            <a:ext cx="688515" cy="369332"/>
           </a:xfrm>
           <a:prstGeom prst="rect">
             <a:avLst/>
@@ -7032,27 +7032,97 @@
           <a:p>
             <a:pPr algn="ctr" eaLnBrk="1" hangingPunct="1"/>
             <a:r>
-              <a:rPr lang="de-DE" sz="1200" b="0" dirty="0">
+              <a:rPr lang="de-DE" sz="1200" b="0" dirty="0" err="1">
                 <a:solidFill>
                   <a:srgbClr val="000000"/>
                 </a:solidFill>
-                <a:latin typeface="Arial" charset="0"/>
+                <a:latin typeface="+mn-lt"/>
                 <a:cs typeface="Arial" charset="0"/>
               </a:rPr>
-              <a:t>Input AST</a:t>
-            </a:r>
-          </a:p>
-          <a:p>
-            <a:pPr algn="ctr" eaLnBrk="1" hangingPunct="1"/>
-            <a:r>
-              <a:rPr lang="de-DE" sz="1200" b="0" dirty="0">
+              <a:t>i</a:t>
+            </a:r>
+            <a:r>
+              <a:rPr lang="de-DE" sz="1200" b="0" dirty="0" err="1" smtClean="0">
                 <a:solidFill>
                   <a:srgbClr val="000000"/>
                 </a:solidFill>
-                <a:latin typeface="Arial" charset="0"/>
+                <a:latin typeface="+mn-lt"/>
                 <a:cs typeface="Arial" charset="0"/>
               </a:rPr>
-              <a:t>(1. State)</a:t>
+              <a:t>nput</a:t>
+            </a:r>
+            <a:r>
+              <a:rPr lang="de-DE" sz="1200" b="0" dirty="0" smtClean="0">
+                <a:solidFill>
+                  <a:srgbClr val="000000"/>
+                </a:solidFill>
+                <a:latin typeface="+mn-lt"/>
+                <a:cs typeface="Arial" charset="0"/>
+              </a:rPr>
+              <a:t> </a:t>
+            </a:r>
+            <a:r>
+              <a:rPr lang="de-DE" sz="1200" b="0" dirty="0">
+                <a:solidFill>
+                  <a:srgbClr val="000000"/>
+                </a:solidFill>
+                <a:latin typeface="+mn-lt"/>
+                <a:cs typeface="Arial" charset="0"/>
+              </a:rPr>
+              <a:t>AST</a:t>
+            </a:r>
+          </a:p>
+          <a:p>
+            <a:pPr algn="ctr" eaLnBrk="1" hangingPunct="1"/>
+            <a:r>
+              <a:rPr lang="de-DE" sz="1200" b="0" dirty="0" smtClean="0">
+                <a:solidFill>
+                  <a:srgbClr val="000000"/>
+                </a:solidFill>
+                <a:latin typeface="+mn-lt"/>
+                <a:cs typeface="Arial" charset="0"/>
+              </a:rPr>
+              <a:t>(</a:t>
+            </a:r>
+            <a:r>
+              <a:rPr lang="de-DE" sz="1200" b="0" dirty="0" err="1" smtClean="0">
+                <a:solidFill>
+                  <a:srgbClr val="000000"/>
+                </a:solidFill>
+                <a:latin typeface="+mn-lt"/>
+                <a:cs typeface="Arial" charset="0"/>
+              </a:rPr>
+              <a:t>first</a:t>
+            </a:r>
+            <a:r>
+              <a:rPr lang="de-DE" sz="1200" b="0" dirty="0" smtClean="0">
+                <a:solidFill>
+                  <a:srgbClr val="000000"/>
+                </a:solidFill>
+                <a:latin typeface="+mn-lt"/>
+                <a:cs typeface="Arial" charset="0"/>
+              </a:rPr>
+              <a:t> </a:t>
+            </a:r>
+            <a:r>
+              <a:rPr lang="de-DE" sz="1200" b="0" dirty="0" err="1" smtClean="0">
+                <a:solidFill>
+                  <a:srgbClr val="000000"/>
+                </a:solidFill>
+                <a:latin typeface="+mn-lt"/>
+                <a:cs typeface="Arial" charset="0"/>
+              </a:rPr>
+              <a:t>state</a:t>
+            </a:r>
+            <a:r>
+              <a:rPr lang="de-DE" sz="1200" b="0" dirty="0">
+                <a:solidFill>
+                  <a:srgbClr val="000000"/>
+                </a:solidFill>
+                <a:latin typeface="+mn-lt"/>
+                <a:cs typeface="Arial" charset="0"/>
+              </a:rPr>
+              <a:t>)</a:t>
             </a:r>
           </a:p>
         </p:txBody>
@@ -7067,8 +7137,8 @@
         </p:nvSpPr>
         <p:spPr bwMode="auto">
           <a:xfrm>
-            <a:off x="1589759" y="2976563"/>
-            <a:ext cx="684457" cy="369332"/>
+            <a:off x="1616972" y="2976563"/>
+            <a:ext cx="630030" cy="369332"/>
           </a:xfrm>
           <a:prstGeom prst="rect">
             <a:avLst/>
@@ -7212,33 +7282,60 @@
           <a:p>
             <a:pPr algn="ctr" eaLnBrk="1" hangingPunct="1"/>
             <a:r>
-              <a:rPr lang="de-DE" sz="1200" b="0" dirty="0">
+              <a:rPr lang="de-DE" sz="1200" b="0" dirty="0" err="1">
                 <a:solidFill>
                   <a:srgbClr val="000000"/>
                 </a:solidFill>
-                <a:latin typeface="Arial" charset="0"/>
+                <a:latin typeface="+mn-lt"/>
                 <a:cs typeface="Arial" charset="0"/>
               </a:rPr>
-              <a:t>Attributes</a:t>
-            </a:r>
-          </a:p>
-          <a:p>
-            <a:pPr algn="ctr" eaLnBrk="1" hangingPunct="1"/>
-            <a:r>
-              <a:rPr lang="de-DE" sz="1200" b="0" dirty="0" err="1">
+              <a:t>a</a:t>
+            </a:r>
+            <a:r>
+              <a:rPr lang="de-DE" sz="1200" b="0" dirty="0" err="1" smtClean="0">
                 <a:solidFill>
                   <a:srgbClr val="000000"/>
                 </a:solidFill>
-                <a:latin typeface="Arial" charset="0"/>
+                <a:latin typeface="+mn-lt"/>
                 <a:cs typeface="Arial" charset="0"/>
               </a:rPr>
-              <a:t>Evaluated</a:t>
+              <a:t>ttributes</a:t>
             </a:r>
             <a:endParaRPr lang="de-DE" sz="1200" b="0" dirty="0">
               <a:solidFill>
                 <a:srgbClr val="000000"/>
               </a:solidFill>
-              <a:latin typeface="Arial" charset="0"/>
+              <a:latin typeface="+mn-lt"/>
+              <a:cs typeface="Arial" charset="0"/>
+            </a:endParaRPr>
+          </a:p>
+          <a:p>
+            <a:pPr algn="ctr" eaLnBrk="1" hangingPunct="1"/>
+            <a:r>
+              <a:rPr lang="de-DE" sz="1200" b="0" dirty="0" err="1">
+                <a:solidFill>
+                  <a:srgbClr val="000000"/>
+                </a:solidFill>
+                <a:latin typeface="+mn-lt"/>
+                <a:cs typeface="Arial" charset="0"/>
+              </a:rPr>
+              <a:t>e</a:t>
+            </a:r>
+            <a:r>
+              <a:rPr lang="de-DE" sz="1200" b="0" dirty="0" err="1" smtClean="0">
+                <a:solidFill>
+                  <a:srgbClr val="000000"/>
+                </a:solidFill>
+                <a:latin typeface="+mn-lt"/>
+                <a:cs typeface="Arial" charset="0"/>
+              </a:rPr>
+              <a:t>valuated</a:t>
+            </a:r>
+            <a:endParaRPr lang="de-DE" sz="1200" b="0" dirty="0">
+              <a:solidFill>
+                <a:srgbClr val="000000"/>
+              </a:solidFill>
+              <a:latin typeface="+mn-lt"/>
               <a:cs typeface="Arial" charset="0"/>
             </a:endParaRPr>
           </a:p>
@@ -7254,8 +7351,8 @@
         </p:nvSpPr>
         <p:spPr bwMode="auto">
           <a:xfrm>
-            <a:off x="2878138" y="2976563"/>
-            <a:ext cx="546100" cy="184150"/>
+            <a:off x="2753644" y="2976563"/>
+            <a:ext cx="795089" cy="184666"/>
           </a:xfrm>
           <a:prstGeom prst="rect">
             <a:avLst/>
@@ -7399,15 +7496,52 @@
           <a:p>
             <a:pPr algn="ctr" eaLnBrk="1" hangingPunct="1"/>
             <a:r>
-              <a:rPr lang="de-DE" sz="1200" b="0" dirty="0">
+              <a:rPr lang="de-DE" sz="1200" b="0" dirty="0" err="1">
                 <a:solidFill>
                   <a:srgbClr val="000000"/>
                 </a:solidFill>
-                <a:latin typeface="Arial" charset="0"/>
+                <a:latin typeface="+mn-lt"/>
                 <a:cs typeface="Arial" charset="0"/>
               </a:rPr>
-              <a:t>2. State</a:t>
-            </a:r>
+              <a:t>s</a:t>
+            </a:r>
+            <a:r>
+              <a:rPr lang="de-DE" sz="1200" b="0" dirty="0" err="1" smtClean="0">
+                <a:solidFill>
+                  <a:srgbClr val="000000"/>
+                </a:solidFill>
+                <a:latin typeface="+mn-lt"/>
+                <a:cs typeface="Arial" charset="0"/>
+              </a:rPr>
+              <a:t>econd</a:t>
+            </a:r>
+            <a:r>
+              <a:rPr lang="de-DE" sz="1200" b="0" dirty="0" smtClean="0">
+                <a:solidFill>
+                  <a:srgbClr val="000000"/>
+                </a:solidFill>
+                <a:latin typeface="+mn-lt"/>
+                <a:cs typeface="Arial" charset="0"/>
+              </a:rPr>
+              <a:t> </a:t>
+            </a:r>
+            <a:r>
+              <a:rPr lang="de-DE" sz="1200" b="0" dirty="0" err="1" smtClean="0">
+                <a:solidFill>
+                  <a:srgbClr val="000000"/>
+                </a:solidFill>
+                <a:latin typeface="+mn-lt"/>
+                <a:cs typeface="Arial" charset="0"/>
+              </a:rPr>
+              <a:t>state</a:t>
+            </a:r>
+            <a:endParaRPr lang="de-DE" sz="1200" b="0" dirty="0">
+              <a:solidFill>
+                <a:srgbClr val="000000"/>
+              </a:solidFill>
+              <a:latin typeface="+mn-lt"/>
+              <a:cs typeface="Arial" charset="0"/>
+            </a:endParaRPr>
           </a:p>
         </p:txBody>
       </p:sp>
@@ -7421,8 +7555,8 @@
         </p:nvSpPr>
         <p:spPr bwMode="auto">
           <a:xfrm>
-            <a:off x="3643984" y="2976563"/>
-            <a:ext cx="684457" cy="369332"/>
+            <a:off x="3671197" y="2976563"/>
+            <a:ext cx="630030" cy="369332"/>
           </a:xfrm>
           <a:prstGeom prst="rect">
             <a:avLst/>
@@ -7566,33 +7700,60 @@
           <a:p>
             <a:pPr algn="ctr" eaLnBrk="1" hangingPunct="1"/>
             <a:r>
-              <a:rPr lang="de-DE" sz="1200" b="0" dirty="0">
+              <a:rPr lang="de-DE" sz="1200" b="0" dirty="0" err="1">
                 <a:solidFill>
                   <a:srgbClr val="000000"/>
                 </a:solidFill>
-                <a:latin typeface="Arial" charset="0"/>
+                <a:latin typeface="+mn-lt"/>
                 <a:cs typeface="Arial" charset="0"/>
               </a:rPr>
-              <a:t>Attributes</a:t>
-            </a:r>
-          </a:p>
-          <a:p>
-            <a:pPr algn="ctr" eaLnBrk="1" hangingPunct="1"/>
-            <a:r>
-              <a:rPr lang="de-DE" sz="1200" b="0" dirty="0" err="1">
+              <a:t>a</a:t>
+            </a:r>
+            <a:r>
+              <a:rPr lang="de-DE" sz="1200" b="0" dirty="0" err="1" smtClean="0">
                 <a:solidFill>
                   <a:srgbClr val="000000"/>
                 </a:solidFill>
-                <a:latin typeface="Arial" charset="0"/>
+                <a:latin typeface="+mn-lt"/>
                 <a:cs typeface="Arial" charset="0"/>
               </a:rPr>
-              <a:t>Evaluated</a:t>
+              <a:t>ttributes</a:t>
             </a:r>
             <a:endParaRPr lang="de-DE" sz="1200" b="0" dirty="0">
               <a:solidFill>
                 <a:srgbClr val="000000"/>
               </a:solidFill>
-              <a:latin typeface="Arial" charset="0"/>
+              <a:latin typeface="+mn-lt"/>
+              <a:cs typeface="Arial" charset="0"/>
+            </a:endParaRPr>
+          </a:p>
+          <a:p>
+            <a:pPr algn="ctr" eaLnBrk="1" hangingPunct="1"/>
+            <a:r>
+              <a:rPr lang="de-DE" sz="1200" b="0" dirty="0" err="1">
+                <a:solidFill>
+                  <a:srgbClr val="000000"/>
+                </a:solidFill>
+                <a:latin typeface="+mn-lt"/>
+                <a:cs typeface="Arial" charset="0"/>
+              </a:rPr>
+              <a:t>e</a:t>
+            </a:r>
+            <a:r>
+              <a:rPr lang="de-DE" sz="1200" b="0" dirty="0" err="1" smtClean="0">
+                <a:solidFill>
+                  <a:srgbClr val="000000"/>
+                </a:solidFill>
+                <a:latin typeface="+mn-lt"/>
+                <a:cs typeface="Arial" charset="0"/>
+              </a:rPr>
+              <a:t>valuated</a:t>
+            </a:r>
+            <a:endParaRPr lang="de-DE" sz="1200" b="0" dirty="0">
+              <a:solidFill>
+                <a:srgbClr val="000000"/>
+              </a:solidFill>
+              <a:latin typeface="+mn-lt"/>
               <a:cs typeface="Arial" charset="0"/>
             </a:endParaRPr>
           </a:p>
@@ -7608,8 +7769,8 @@
         </p:nvSpPr>
         <p:spPr bwMode="auto">
           <a:xfrm>
-            <a:off x="5029200" y="2976563"/>
-            <a:ext cx="547688" cy="184150"/>
+            <a:off x="4976032" y="2976563"/>
+            <a:ext cx="654025" cy="184666"/>
           </a:xfrm>
           <a:prstGeom prst="rect">
             <a:avLst/>
@@ -7753,15 +7914,62 @@
           <a:p>
             <a:pPr algn="ctr" eaLnBrk="1" hangingPunct="1"/>
             <a:r>
-              <a:rPr lang="de-DE" sz="1200" b="0" dirty="0">
+              <a:rPr lang="de-DE" sz="1200" b="0" dirty="0" err="1">
                 <a:solidFill>
                   <a:srgbClr val="000000"/>
                 </a:solidFill>
-                <a:latin typeface="Arial" charset="0"/>
+                <a:latin typeface="+mn-lt"/>
                 <a:cs typeface="Arial" charset="0"/>
               </a:rPr>
-              <a:t>3. State</a:t>
-            </a:r>
+              <a:t>t</a:t>
+            </a:r>
+            <a:r>
+              <a:rPr lang="de-DE" sz="1200" b="0" dirty="0" err="1" smtClean="0">
+                <a:solidFill>
+                  <a:srgbClr val="000000"/>
+                </a:solidFill>
+                <a:latin typeface="+mn-lt"/>
+                <a:cs typeface="Arial" charset="0"/>
+              </a:rPr>
+              <a:t>hird</a:t>
+            </a:r>
+            <a:r>
+              <a:rPr lang="de-DE" sz="1200" b="0" dirty="0" smtClean="0">
+                <a:solidFill>
+                  <a:srgbClr val="000000"/>
+                </a:solidFill>
+                <a:latin typeface="+mn-lt"/>
+                <a:cs typeface="Arial" charset="0"/>
+              </a:rPr>
+              <a:t> </a:t>
+            </a:r>
+            <a:r>
+              <a:rPr lang="de-DE" sz="1200" b="0" dirty="0" err="1">
+                <a:solidFill>
+                  <a:srgbClr val="000000"/>
+                </a:solidFill>
+                <a:latin typeface="+mn-lt"/>
+                <a:cs typeface="Arial" charset="0"/>
+              </a:rPr>
+              <a:t>s</a:t>
+            </a:r>
+            <a:r>
+              <a:rPr lang="de-DE" sz="1200" b="0" dirty="0" err="1" smtClean="0">
+                <a:solidFill>
+                  <a:srgbClr val="000000"/>
+                </a:solidFill>
+                <a:latin typeface="+mn-lt"/>
+                <a:cs typeface="Arial" charset="0"/>
+              </a:rPr>
+              <a:t>tate</a:t>
+            </a:r>
+            <a:endParaRPr lang="de-DE" sz="1200" b="0" dirty="0">
+              <a:solidFill>
+                <a:srgbClr val="000000"/>
+              </a:solidFill>
+              <a:latin typeface="+mn-lt"/>
+              <a:cs typeface="Arial" charset="0"/>
+            </a:endParaRPr>
           </a:p>
         </p:txBody>
       </p:sp>
@@ -7775,8 +7983,8 @@
         </p:nvSpPr>
         <p:spPr bwMode="auto">
           <a:xfrm>
-            <a:off x="7346950" y="2976563"/>
-            <a:ext cx="547688" cy="184150"/>
+            <a:off x="7248897" y="2976563"/>
+            <a:ext cx="743793" cy="184666"/>
           </a:xfrm>
           <a:prstGeom prst="rect">
             <a:avLst/>
@@ -7920,15 +8128,52 @@
           <a:p>
             <a:pPr algn="ctr" eaLnBrk="1" hangingPunct="1"/>
             <a:r>
-              <a:rPr lang="de-DE" sz="1200" b="0">
+              <a:rPr lang="de-DE" sz="1200" b="0" dirty="0" err="1" smtClean="0">
                 <a:solidFill>
                   <a:srgbClr val="000000"/>
                 </a:solidFill>
-                <a:latin typeface="Arial" charset="0"/>
+                <a:latin typeface="+mn-lt"/>
                 <a:cs typeface="Arial" charset="0"/>
               </a:rPr>
-              <a:t>4. State</a:t>
-            </a:r>
+              <a:t>fourth</a:t>
+            </a:r>
+            <a:r>
+              <a:rPr lang="de-DE" sz="1200" b="0" dirty="0" smtClean="0">
+                <a:solidFill>
+                  <a:srgbClr val="000000"/>
+                </a:solidFill>
+                <a:latin typeface="+mn-lt"/>
+                <a:cs typeface="Arial" charset="0"/>
+              </a:rPr>
+              <a:t> </a:t>
+            </a:r>
+            <a:r>
+              <a:rPr lang="de-DE" sz="1200" b="0" dirty="0" err="1">
+                <a:solidFill>
+                  <a:srgbClr val="000000"/>
+                </a:solidFill>
+                <a:latin typeface="+mn-lt"/>
+                <a:cs typeface="Arial" charset="0"/>
+              </a:rPr>
+              <a:t>s</a:t>
+            </a:r>
+            <a:r>
+              <a:rPr lang="de-DE" sz="1200" b="0" dirty="0" err="1" smtClean="0">
+                <a:solidFill>
+                  <a:srgbClr val="000000"/>
+                </a:solidFill>
+                <a:latin typeface="+mn-lt"/>
+                <a:cs typeface="Arial" charset="0"/>
+              </a:rPr>
+              <a:t>tate</a:t>
+            </a:r>
+            <a:endParaRPr lang="de-DE" sz="1200" b="0" dirty="0">
+              <a:solidFill>
+                <a:srgbClr val="000000"/>
+              </a:solidFill>
+              <a:latin typeface="+mn-lt"/>
+              <a:cs typeface="Arial" charset="0"/>
+            </a:endParaRPr>
           </a:p>
         </p:txBody>
       </p:sp>
@@ -8091,6 +8336,7 @@
                 <a:solidFill>
                   <a:srgbClr val="000000"/>
                 </a:solidFill>
+                <a:latin typeface="+mn-lt"/>
               </a:rPr>
               <a:t>...</a:t>
             </a:r>
@@ -8107,8 +8353,8 @@
         </p:nvSpPr>
         <p:spPr bwMode="auto">
           <a:xfrm>
-            <a:off x="5914903" y="2976563"/>
-            <a:ext cx="684457" cy="369332"/>
+            <a:off x="5942116" y="2976563"/>
+            <a:ext cx="630030" cy="369332"/>
           </a:xfrm>
           <a:prstGeom prst="rect">
             <a:avLst/>
@@ -8252,33 +8498,60 @@
           <a:p>
             <a:pPr algn="ctr" eaLnBrk="1" hangingPunct="1"/>
             <a:r>
-              <a:rPr lang="de-DE" sz="1200" b="0" dirty="0">
+              <a:rPr lang="de-DE" sz="1200" b="0" dirty="0" err="1">
                 <a:solidFill>
                   <a:srgbClr val="000000"/>
                 </a:solidFill>
-                <a:latin typeface="Arial" charset="0"/>
+                <a:latin typeface="+mn-lt"/>
                 <a:cs typeface="Arial" charset="0"/>
               </a:rPr>
-              <a:t>Attributes</a:t>
-            </a:r>
-          </a:p>
-          <a:p>
-            <a:pPr algn="ctr" eaLnBrk="1" hangingPunct="1"/>
-            <a:r>
-              <a:rPr lang="de-DE" sz="1200" b="0" dirty="0" err="1">
+              <a:t>a</a:t>
+            </a:r>
+            <a:r>
+              <a:rPr lang="de-DE" sz="1200" b="0" dirty="0" err="1" smtClean="0">
                 <a:solidFill>
                   <a:srgbClr val="000000"/>
                 </a:solidFill>
-                <a:latin typeface="Arial" charset="0"/>
+                <a:latin typeface="+mn-lt"/>
                 <a:cs typeface="Arial" charset="0"/>
               </a:rPr>
-              <a:t>Evaluated</a:t>
+              <a:t>ttributes</a:t>
             </a:r>
             <a:endParaRPr lang="de-DE" sz="1200" b="0" dirty="0">
               <a:solidFill>
                 <a:srgbClr val="000000"/>
               </a:solidFill>
-              <a:latin typeface="Arial" charset="0"/>
+              <a:latin typeface="+mn-lt"/>
+              <a:cs typeface="Arial" charset="0"/>
+            </a:endParaRPr>
+          </a:p>
+          <a:p>
+            <a:pPr algn="ctr" eaLnBrk="1" hangingPunct="1"/>
+            <a:r>
+              <a:rPr lang="de-DE" sz="1200" b="0" dirty="0" err="1">
+                <a:solidFill>
+                  <a:srgbClr val="000000"/>
+                </a:solidFill>
+                <a:latin typeface="+mn-lt"/>
+                <a:cs typeface="Arial" charset="0"/>
+              </a:rPr>
+              <a:t>e</a:t>
+            </a:r>
+            <a:r>
+              <a:rPr lang="de-DE" sz="1200" b="0" dirty="0" err="1" smtClean="0">
+                <a:solidFill>
+                  <a:srgbClr val="000000"/>
+                </a:solidFill>
+                <a:latin typeface="+mn-lt"/>
+                <a:cs typeface="Arial" charset="0"/>
+              </a:rPr>
+              <a:t>valuated</a:t>
+            </a:r>
+            <a:endParaRPr lang="de-DE" sz="1200" b="0" dirty="0">
+              <a:solidFill>
+                <a:srgbClr val="000000"/>
+              </a:solidFill>
+              <a:latin typeface="+mn-lt"/>
               <a:cs typeface="Arial" charset="0"/>
             </a:endParaRPr>
           </a:p>
@@ -8434,7 +8707,6 @@
               <a:solidFill>
                 <a:schemeClr val="tx1"/>
               </a:solidFill>
-              <a:latin typeface="Microsoft Sans Serif" pitchFamily="34" charset="0"/>
               <a:ea typeface="+mn-ea"/>
               <a:cs typeface="+mn-cs"/>
             </a:endParaRPr>
@@ -8516,7 +8788,6 @@
               <a:solidFill>
                 <a:schemeClr val="tx1"/>
               </a:solidFill>
-              <a:latin typeface="Microsoft Sans Serif" pitchFamily="34" charset="0"/>
               <a:ea typeface="+mn-ea"/>
               <a:cs typeface="+mn-cs"/>
             </a:endParaRPr>
@@ -8562,7 +8833,6 @@
               <a:solidFill>
                 <a:schemeClr val="tx1"/>
               </a:solidFill>
-              <a:latin typeface="Microsoft Sans Serif" pitchFamily="34" charset="0"/>
               <a:ea typeface="+mn-ea"/>
               <a:cs typeface="+mn-cs"/>
             </a:endParaRPr>
@@ -8679,7 +8949,6 @@
               <a:solidFill>
                 <a:schemeClr val="tx1"/>
               </a:solidFill>
-              <a:latin typeface="Microsoft Sans Serif" pitchFamily="34" charset="0"/>
               <a:ea typeface="+mn-ea"/>
               <a:cs typeface="+mn-cs"/>
             </a:endParaRPr>
@@ -8725,7 +8994,6 @@
               <a:solidFill>
                 <a:schemeClr val="tx1"/>
               </a:solidFill>
-              <a:latin typeface="Microsoft Sans Serif" pitchFamily="34" charset="0"/>
               <a:ea typeface="+mn-ea"/>
               <a:cs typeface="+mn-cs"/>
             </a:endParaRPr>
@@ -8807,7 +9075,6 @@
               <a:solidFill>
                 <a:schemeClr val="tx1"/>
               </a:solidFill>
-              <a:latin typeface="Microsoft Sans Serif" pitchFamily="34" charset="0"/>
               <a:ea typeface="+mn-ea"/>
               <a:cs typeface="+mn-cs"/>
             </a:endParaRPr>
@@ -8853,7 +9120,6 @@
               <a:solidFill>
                 <a:schemeClr val="tx1"/>
               </a:solidFill>
-              <a:latin typeface="Microsoft Sans Serif" pitchFamily="34" charset="0"/>
               <a:ea typeface="+mn-ea"/>
               <a:cs typeface="+mn-cs"/>
             </a:endParaRPr>
@@ -8905,8 +9171,8 @@
         </p:nvSpPr>
         <p:spPr bwMode="auto">
           <a:xfrm>
-            <a:off x="2014963" y="4249738"/>
-            <a:ext cx="427776" cy="184666"/>
+            <a:off x="2029502" y="4249738"/>
+            <a:ext cx="398697" cy="184666"/>
           </a:xfrm>
           <a:prstGeom prst="rect">
             <a:avLst/>
@@ -9054,7 +9320,7 @@
                 <a:solidFill>
                   <a:srgbClr val="000000"/>
                 </a:solidFill>
-                <a:latin typeface="Arial" charset="0"/>
+                <a:latin typeface="+mn-lt"/>
                 <a:cs typeface="Arial" charset="0"/>
               </a:rPr>
               <a:t>l</a:t>
@@ -9064,7 +9330,7 @@
                 <a:solidFill>
                   <a:srgbClr val="000000"/>
                 </a:solidFill>
-                <a:latin typeface="Arial" charset="0"/>
+                <a:latin typeface="+mn-lt"/>
                 <a:cs typeface="Arial" charset="0"/>
               </a:rPr>
               <a:t>-hand</a:t>
@@ -9073,7 +9339,7 @@
               <a:solidFill>
                 <a:srgbClr val="000000"/>
               </a:solidFill>
-              <a:latin typeface="Arial" charset="0"/>
+              <a:latin typeface="+mn-lt"/>
               <a:cs typeface="Arial" charset="0"/>
             </a:endParaRPr>
           </a:p>
@@ -9089,8 +9355,8 @@
         </p:nvSpPr>
         <p:spPr bwMode="auto">
           <a:xfrm>
-            <a:off x="2764096" y="4249738"/>
-            <a:ext cx="444833" cy="184666"/>
+            <a:off x="2777997" y="4249738"/>
+            <a:ext cx="417031" cy="184666"/>
           </a:xfrm>
           <a:prstGeom prst="rect">
             <a:avLst/>
@@ -9238,7 +9504,7 @@
                 <a:solidFill>
                   <a:srgbClr val="000000"/>
                 </a:solidFill>
-                <a:latin typeface="Arial" charset="0"/>
+                <a:latin typeface="+mn-lt"/>
                 <a:cs typeface="Arial" charset="0"/>
               </a:rPr>
               <a:t>r-hand</a:t>
@@ -9247,7 +9513,7 @@
               <a:solidFill>
                 <a:srgbClr val="000000"/>
               </a:solidFill>
-              <a:latin typeface="Arial" charset="0"/>
+              <a:latin typeface="+mn-lt"/>
               <a:cs typeface="Arial" charset="0"/>
             </a:endParaRPr>
           </a:p>
@@ -9338,10 +9604,10 @@
           <a:p>
             <a:pPr algn="ctr"/>
             <a:r>
-              <a:rPr lang="de-DE" sz="1000" dirty="0" smtClean="0"/>
+              <a:rPr lang="de-DE" sz="1000" b="1" dirty="0" smtClean="0"/>
               <a:t>3</a:t>
             </a:r>
-            <a:endParaRPr lang="de-DE" sz="1000" dirty="0"/>
+            <a:endParaRPr lang="de-DE" sz="1000" b="1" dirty="0"/>
           </a:p>
         </p:txBody>
       </p:sp>
@@ -9545,10 +9811,10 @@
           <a:p>
             <a:pPr algn="ctr"/>
             <a:r>
-              <a:rPr lang="de-DE" sz="1000" dirty="0" smtClean="0"/>
+              <a:rPr lang="de-DE" sz="1000" b="1" dirty="0" smtClean="0"/>
               <a:t>3</a:t>
             </a:r>
-            <a:endParaRPr lang="de-DE" sz="1000" dirty="0"/>
+            <a:endParaRPr lang="de-DE" sz="1000" b="1" dirty="0"/>
           </a:p>
         </p:txBody>
       </p:sp>
@@ -9625,7 +9891,6 @@
               <a:solidFill>
                 <a:schemeClr val="tx1"/>
               </a:solidFill>
-              <a:latin typeface="Microsoft Sans Serif" pitchFamily="34" charset="0"/>
               <a:ea typeface="+mn-ea"/>
               <a:cs typeface="+mn-cs"/>
             </a:endParaRPr>
@@ -9671,7 +9936,6 @@
               <a:solidFill>
                 <a:schemeClr val="tx1"/>
               </a:solidFill>
-              <a:latin typeface="Microsoft Sans Serif" pitchFamily="34" charset="0"/>
               <a:ea typeface="+mn-ea"/>
               <a:cs typeface="+mn-cs"/>
             </a:endParaRPr>
@@ -9753,7 +10017,6 @@
               <a:solidFill>
                 <a:schemeClr val="tx1"/>
               </a:solidFill>
-              <a:latin typeface="Microsoft Sans Serif" pitchFamily="34" charset="0"/>
               <a:ea typeface="+mn-ea"/>
               <a:cs typeface="+mn-cs"/>
             </a:endParaRPr>
@@ -9799,7 +10062,6 @@
               <a:solidFill>
                 <a:schemeClr val="tx1"/>
               </a:solidFill>
-              <a:latin typeface="Microsoft Sans Serif" pitchFamily="34" charset="0"/>
               <a:ea typeface="+mn-ea"/>
               <a:cs typeface="+mn-cs"/>
             </a:endParaRPr>
@@ -9880,7 +10142,6 @@
               <a:solidFill>
                 <a:schemeClr val="tx1"/>
               </a:solidFill>
-              <a:latin typeface="Microsoft Sans Serif" pitchFamily="34" charset="0"/>
               <a:ea typeface="+mn-ea"/>
               <a:cs typeface="+mn-cs"/>
             </a:endParaRPr>
@@ -10083,7 +10344,6 @@
               <a:solidFill>
                 <a:schemeClr val="tx1"/>
               </a:solidFill>
-              <a:latin typeface="Microsoft Sans Serif" pitchFamily="34" charset="0"/>
               <a:ea typeface="+mn-ea"/>
               <a:cs typeface="+mn-cs"/>
             </a:endParaRPr>
@@ -10129,7 +10389,6 @@
               <a:solidFill>
                 <a:schemeClr val="tx1"/>
               </a:solidFill>
-              <a:latin typeface="Microsoft Sans Serif" pitchFamily="34" charset="0"/>
               <a:ea typeface="+mn-ea"/>
               <a:cs typeface="+mn-cs"/>
             </a:endParaRPr>
@@ -10211,7 +10470,6 @@
               <a:solidFill>
                 <a:schemeClr val="tx1"/>
               </a:solidFill>
-              <a:latin typeface="Microsoft Sans Serif" pitchFamily="34" charset="0"/>
               <a:ea typeface="+mn-ea"/>
               <a:cs typeface="+mn-cs"/>
             </a:endParaRPr>
@@ -10257,7 +10515,6 @@
               <a:solidFill>
                 <a:schemeClr val="tx1"/>
               </a:solidFill>
-              <a:latin typeface="Microsoft Sans Serif" pitchFamily="34" charset="0"/>
               <a:ea typeface="+mn-ea"/>
               <a:cs typeface="+mn-cs"/>
             </a:endParaRPr>
@@ -10380,10 +10637,10 @@
           <a:p>
             <a:pPr algn="ctr"/>
             <a:r>
-              <a:rPr lang="de-DE" sz="1000" dirty="0" smtClean="0"/>
+              <a:rPr lang="de-DE" sz="1000" b="1" dirty="0" smtClean="0"/>
               <a:t>4</a:t>
             </a:r>
-            <a:endParaRPr lang="de-DE" sz="1000" dirty="0"/>
+            <a:endParaRPr lang="de-DE" sz="1000" b="1" dirty="0"/>
           </a:p>
         </p:txBody>
       </p:sp>
@@ -10498,7 +10755,6 @@
               <a:solidFill>
                 <a:schemeClr val="tx1"/>
               </a:solidFill>
-              <a:latin typeface="Microsoft Sans Serif" pitchFamily="34" charset="0"/>
               <a:ea typeface="+mn-ea"/>
               <a:cs typeface="+mn-cs"/>
             </a:endParaRPr>
@@ -10603,10 +10859,10 @@
           <a:p>
             <a:pPr algn="ctr"/>
             <a:r>
-              <a:rPr lang="de-DE" sz="1000" dirty="0" smtClean="0"/>
+              <a:rPr lang="de-DE" sz="1000" b="1" dirty="0" smtClean="0"/>
               <a:t>4</a:t>
             </a:r>
-            <a:endParaRPr lang="de-DE" sz="1000" dirty="0"/>
+            <a:endParaRPr lang="de-DE" sz="1000" b="1" dirty="0"/>
           </a:p>
         </p:txBody>
       </p:sp>
@@ -10684,7 +10940,6 @@
               <a:solidFill>
                 <a:schemeClr val="tx1"/>
               </a:solidFill>
-              <a:latin typeface="Microsoft Sans Serif" pitchFamily="34" charset="0"/>
               <a:ea typeface="+mn-ea"/>
               <a:cs typeface="+mn-cs"/>
             </a:endParaRPr>
@@ -10766,7 +11021,6 @@
               <a:solidFill>
                 <a:schemeClr val="tx1"/>
               </a:solidFill>
-              <a:latin typeface="Microsoft Sans Serif" pitchFamily="34" charset="0"/>
               <a:ea typeface="+mn-ea"/>
               <a:cs typeface="+mn-cs"/>
             </a:endParaRPr>
@@ -10848,7 +11102,6 @@
               <a:solidFill>
                 <a:schemeClr val="tx1"/>
               </a:solidFill>
-              <a:latin typeface="Microsoft Sans Serif" pitchFamily="34" charset="0"/>
               <a:ea typeface="+mn-ea"/>
               <a:cs typeface="+mn-cs"/>
             </a:endParaRPr>
@@ -10929,7 +11182,6 @@
               <a:solidFill>
                 <a:schemeClr val="tx1"/>
               </a:solidFill>
-              <a:latin typeface="Microsoft Sans Serif" pitchFamily="34" charset="0"/>
               <a:ea typeface="+mn-ea"/>
               <a:cs typeface="+mn-cs"/>
             </a:endParaRPr>
@@ -11010,7 +11262,6 @@
               <a:solidFill>
                 <a:schemeClr val="tx1"/>
               </a:solidFill>
-              <a:latin typeface="Microsoft Sans Serif" pitchFamily="34" charset="0"/>
               <a:ea typeface="+mn-ea"/>
               <a:cs typeface="+mn-cs"/>
             </a:endParaRPr>
@@ -11091,7 +11342,6 @@
               <a:solidFill>
                 <a:schemeClr val="tx1"/>
               </a:solidFill>
-              <a:latin typeface="Microsoft Sans Serif" pitchFamily="34" charset="0"/>
               <a:ea typeface="+mn-ea"/>
               <a:cs typeface="+mn-cs"/>
             </a:endParaRPr>
@@ -11172,7 +11422,6 @@
               <a:solidFill>
                 <a:schemeClr val="tx1"/>
               </a:solidFill>
-              <a:latin typeface="Microsoft Sans Serif" pitchFamily="34" charset="0"/>
               <a:ea typeface="+mn-ea"/>
               <a:cs typeface="+mn-cs"/>
             </a:endParaRPr>
@@ -11218,7 +11467,6 @@
               <a:solidFill>
                 <a:schemeClr val="tx1"/>
               </a:solidFill>
-              <a:latin typeface="Microsoft Sans Serif" pitchFamily="34" charset="0"/>
               <a:ea typeface="+mn-ea"/>
               <a:cs typeface="+mn-cs"/>
             </a:endParaRPr>
@@ -11264,7 +11512,6 @@
               <a:solidFill>
                 <a:schemeClr val="tx1"/>
               </a:solidFill>
-              <a:latin typeface="Microsoft Sans Serif" pitchFamily="34" charset="0"/>
               <a:ea typeface="+mn-ea"/>
               <a:cs typeface="+mn-cs"/>
             </a:endParaRPr>
@@ -11310,7 +11557,6 @@
               <a:solidFill>
                 <a:schemeClr val="tx1"/>
               </a:solidFill>
-              <a:latin typeface="Microsoft Sans Serif" pitchFamily="34" charset="0"/>
               <a:ea typeface="+mn-ea"/>
               <a:cs typeface="+mn-cs"/>
             </a:endParaRPr>
@@ -11391,7 +11637,6 @@
               <a:solidFill>
                 <a:schemeClr val="tx1"/>
               </a:solidFill>
-              <a:latin typeface="Microsoft Sans Serif" pitchFamily="34" charset="0"/>
               <a:ea typeface="+mn-ea"/>
               <a:cs typeface="+mn-cs"/>
             </a:endParaRPr>
@@ -11558,10 +11803,10 @@
           <a:p>
             <a:pPr algn="ctr"/>
             <a:r>
-              <a:rPr lang="de-DE" sz="1000" dirty="0" smtClean="0"/>
+              <a:rPr lang="de-DE" sz="1000" b="1" dirty="0" smtClean="0"/>
               <a:t>3</a:t>
             </a:r>
-            <a:endParaRPr lang="de-DE" sz="1000" dirty="0"/>
+            <a:endParaRPr lang="de-DE" sz="1000" b="1" dirty="0"/>
           </a:p>
         </p:txBody>
       </p:sp>
@@ -11634,7 +11879,6 @@
               <a:solidFill>
                 <a:schemeClr val="tx1"/>
               </a:solidFill>
-              <a:latin typeface="Microsoft Sans Serif" pitchFamily="34" charset="0"/>
               <a:ea typeface="+mn-ea"/>
               <a:cs typeface="+mn-cs"/>
             </a:endParaRPr>
@@ -11680,7 +11924,6 @@
               <a:solidFill>
                 <a:schemeClr val="tx1"/>
               </a:solidFill>
-              <a:latin typeface="Microsoft Sans Serif" pitchFamily="34" charset="0"/>
               <a:ea typeface="+mn-ea"/>
               <a:cs typeface="+mn-cs"/>
             </a:endParaRPr>
@@ -11761,7 +12004,6 @@
               <a:solidFill>
                 <a:schemeClr val="tx1"/>
               </a:solidFill>
-              <a:latin typeface="Microsoft Sans Serif" pitchFamily="34" charset="0"/>
               <a:ea typeface="+mn-ea"/>
               <a:cs typeface="+mn-cs"/>
             </a:endParaRPr>
@@ -11933,7 +12175,6 @@
               <a:solidFill>
                 <a:schemeClr val="tx1"/>
               </a:solidFill>
-              <a:latin typeface="Microsoft Sans Serif" pitchFamily="34" charset="0"/>
               <a:ea typeface="+mn-ea"/>
               <a:cs typeface="+mn-cs"/>
             </a:endParaRPr>
@@ -12003,7 +12244,7 @@
           <a:p>
             <a:pPr algn="ctr"/>
             <a:r>
-              <a:rPr lang="de-DE" sz="1000" dirty="0"/>
+              <a:rPr lang="de-DE" sz="1000" b="1" dirty="0"/>
               <a:t>3</a:t>
             </a:r>
           </a:p>
@@ -12111,8 +12352,8 @@
         </p:nvSpPr>
         <p:spPr bwMode="auto">
           <a:xfrm>
-            <a:off x="5402933" y="1229752"/>
-            <a:ext cx="1323030" cy="184666"/>
+            <a:off x="5402932" y="1207527"/>
+            <a:ext cx="1588417" cy="215444"/>
           </a:xfrm>
           <a:prstGeom prst="rect">
             <a:avLst/>
@@ -12256,20 +12497,30 @@
           <a:p>
             <a:pPr eaLnBrk="1" hangingPunct="1"/>
             <a:r>
-              <a:rPr lang="de-DE" sz="1200" b="0" dirty="0" smtClean="0">
+              <a:rPr lang="de-DE" sz="1400" b="0" dirty="0" smtClean="0">
                 <a:solidFill>
                   <a:srgbClr val="000000"/>
                 </a:solidFill>
-                <a:latin typeface="Arial" charset="0"/>
+                <a:latin typeface="+mn-lt"/>
                 <a:cs typeface="Arial" charset="0"/>
               </a:rPr>
-              <a:t>Reference Attribute</a:t>
-            </a:r>
-            <a:endParaRPr lang="de-DE" sz="1200" b="0" dirty="0">
+              <a:t>Reference </a:t>
+            </a:r>
+            <a:r>
+              <a:rPr lang="de-DE" sz="1400" b="0" dirty="0" err="1" smtClean="0">
+                <a:solidFill>
+                  <a:srgbClr val="000000"/>
+                </a:solidFill>
+                <a:latin typeface="+mn-lt"/>
+                <a:cs typeface="Arial" charset="0"/>
+              </a:rPr>
+              <a:t>attribute</a:t>
+            </a:r>
+            <a:endParaRPr lang="de-DE" sz="1400" b="0" dirty="0">
               <a:solidFill>
                 <a:srgbClr val="000000"/>
               </a:solidFill>
-              <a:latin typeface="Arial" charset="0"/>
+              <a:latin typeface="+mn-lt"/>
               <a:cs typeface="Arial" charset="0"/>
             </a:endParaRPr>
           </a:p>
@@ -12285,8 +12536,8 @@
         </p:nvSpPr>
         <p:spPr bwMode="auto">
           <a:xfrm>
-            <a:off x="7272856" y="1229752"/>
-            <a:ext cx="978969" cy="184666"/>
+            <a:off x="7272856" y="1207527"/>
+            <a:ext cx="1299644" cy="215444"/>
           </a:xfrm>
           <a:prstGeom prst="rect">
             <a:avLst/>
@@ -12430,30 +12681,40 @@
           <a:p>
             <a:pPr eaLnBrk="1" hangingPunct="1"/>
             <a:r>
-              <a:rPr lang="de-DE" sz="1200" b="0" dirty="0" err="1" smtClean="0">
+              <a:rPr lang="de-DE" sz="1400" b="0" dirty="0" err="1" smtClean="0">
                 <a:solidFill>
                   <a:srgbClr val="000000"/>
                 </a:solidFill>
-                <a:latin typeface="Arial" charset="0"/>
+                <a:latin typeface="+mn-lt"/>
                 <a:cs typeface="Arial" charset="0"/>
               </a:rPr>
               <a:t>Rewrite</a:t>
             </a:r>
             <a:r>
-              <a:rPr lang="de-DE" sz="1200" b="0" dirty="0" smtClean="0">
+              <a:rPr lang="de-DE" sz="1400" b="0" dirty="0" smtClean="0">
                 <a:solidFill>
                   <a:srgbClr val="000000"/>
                 </a:solidFill>
-                <a:latin typeface="Arial" charset="0"/>
+                <a:latin typeface="+mn-lt"/>
                 <a:cs typeface="Arial" charset="0"/>
               </a:rPr>
-              <a:t> Match</a:t>
-            </a:r>
-            <a:endParaRPr lang="de-DE" sz="1200" b="0" dirty="0">
+              <a:t> </a:t>
+            </a:r>
+            <a:r>
+              <a:rPr lang="de-DE" sz="1400" b="0" dirty="0" err="1" smtClean="0">
+                <a:solidFill>
+                  <a:srgbClr val="000000"/>
+                </a:solidFill>
+                <a:latin typeface="+mn-lt"/>
+                <a:cs typeface="Arial" charset="0"/>
+              </a:rPr>
+              <a:t>match</a:t>
+            </a:r>
+            <a:endParaRPr lang="de-DE" sz="1400" b="0" dirty="0">
               <a:solidFill>
                 <a:srgbClr val="000000"/>
               </a:solidFill>
-              <a:latin typeface="Arial" charset="0"/>
+              <a:latin typeface="+mn-lt"/>
               <a:cs typeface="Arial" charset="0"/>
             </a:endParaRPr>
           </a:p>
@@ -12469,8 +12730,8 @@
         </p:nvSpPr>
         <p:spPr bwMode="auto">
           <a:xfrm>
-            <a:off x="1818358" y="1229752"/>
-            <a:ext cx="1350292" cy="184666"/>
+            <a:off x="1818358" y="1207527"/>
+            <a:ext cx="1350292" cy="215444"/>
           </a:xfrm>
           <a:prstGeom prst="rect">
             <a:avLst/>
@@ -12614,30 +12875,40 @@
           <a:p>
             <a:pPr eaLnBrk="1" hangingPunct="1"/>
             <a:r>
-              <a:rPr lang="de-DE" sz="1200" b="0" dirty="0" smtClean="0">
+              <a:rPr lang="de-DE" sz="1400" b="0" dirty="0" smtClean="0">
                 <a:solidFill>
                   <a:srgbClr val="000000"/>
                 </a:solidFill>
-                <a:latin typeface="Arial" charset="0"/>
+                <a:latin typeface="+mn-lt"/>
                 <a:cs typeface="Arial" charset="0"/>
               </a:rPr>
               <a:t>AST </a:t>
             </a:r>
             <a:r>
-              <a:rPr lang="de-DE" sz="1200" b="0" dirty="0" err="1" smtClean="0">
+              <a:rPr lang="de-DE" sz="1400" b="0" dirty="0" err="1">
                 <a:solidFill>
                   <a:srgbClr val="000000"/>
                 </a:solidFill>
-                <a:latin typeface="Arial" charset="0"/>
+                <a:latin typeface="+mn-lt"/>
                 <a:cs typeface="Arial" charset="0"/>
               </a:rPr>
-              <a:t>Node</a:t>
-            </a:r>
-            <a:endParaRPr lang="de-DE" sz="1200" b="0" dirty="0">
+              <a:t>n</a:t>
+            </a:r>
+            <a:r>
+              <a:rPr lang="de-DE" sz="1400" b="0" dirty="0" err="1" smtClean="0">
+                <a:solidFill>
+                  <a:srgbClr val="000000"/>
+                </a:solidFill>
+                <a:latin typeface="+mn-lt"/>
+                <a:cs typeface="Arial" charset="0"/>
+              </a:rPr>
+              <a:t>ode</a:t>
+            </a:r>
+            <a:endParaRPr lang="de-DE" sz="1400" b="0" dirty="0">
               <a:solidFill>
                 <a:srgbClr val="000000"/>
               </a:solidFill>
-              <a:latin typeface="Arial" charset="0"/>
+              <a:latin typeface="+mn-lt"/>
               <a:cs typeface="Arial" charset="0"/>
             </a:endParaRPr>
           </a:p>
@@ -12682,7 +12953,6 @@
               <a:solidFill>
                 <a:schemeClr val="tx1"/>
               </a:solidFill>
-              <a:latin typeface="Microsoft Sans Serif" pitchFamily="34" charset="0"/>
               <a:ea typeface="+mn-ea"/>
               <a:cs typeface="+mn-cs"/>
             </a:endParaRPr>
@@ -12780,8 +13050,8 @@
         </p:nvSpPr>
         <p:spPr bwMode="auto">
           <a:xfrm>
-            <a:off x="3131461" y="1229752"/>
-            <a:ext cx="1571631" cy="184666"/>
+            <a:off x="3131461" y="1207527"/>
+            <a:ext cx="1777089" cy="215444"/>
           </a:xfrm>
           <a:prstGeom prst="rect">
             <a:avLst/>
@@ -12925,20 +13195,80 @@
           <a:p>
             <a:pPr eaLnBrk="1" hangingPunct="1"/>
             <a:r>
-              <a:rPr lang="de-DE" sz="1200" b="0" dirty="0" smtClean="0">
+              <a:rPr lang="de-DE" sz="1400" b="0" dirty="0" smtClean="0">
                 <a:solidFill>
                   <a:srgbClr val="000000"/>
                 </a:solidFill>
-                <a:latin typeface="Arial" charset="0"/>
+                <a:latin typeface="+mn-lt"/>
                 <a:cs typeface="Arial" charset="0"/>
               </a:rPr>
-              <a:t>AST Parent/Child Edge</a:t>
-            </a:r>
-            <a:endParaRPr lang="de-DE" sz="1200" b="0" dirty="0">
+              <a:t>AST </a:t>
+            </a:r>
+            <a:r>
+              <a:rPr lang="de-DE" sz="1400" b="0" dirty="0" err="1" smtClean="0">
+                <a:solidFill>
+                  <a:srgbClr val="000000"/>
+                </a:solidFill>
+                <a:latin typeface="+mn-lt"/>
+                <a:cs typeface="Arial" charset="0"/>
+              </a:rPr>
+              <a:t>parent</a:t>
+            </a:r>
+            <a:r>
+              <a:rPr lang="de-DE" sz="1400" b="0" dirty="0" smtClean="0">
+                <a:solidFill>
+                  <a:srgbClr val="000000"/>
+                </a:solidFill>
+                <a:latin typeface="+mn-lt"/>
+                <a:cs typeface="Arial" charset="0"/>
+              </a:rPr>
+              <a:t>/</a:t>
+            </a:r>
+            <a:r>
+              <a:rPr lang="de-DE" sz="1400" b="0" dirty="0" err="1" smtClean="0">
+                <a:solidFill>
+                  <a:srgbClr val="000000"/>
+                </a:solidFill>
+                <a:latin typeface="+mn-lt"/>
+                <a:cs typeface="Arial" charset="0"/>
+              </a:rPr>
+              <a:t>child</a:t>
+            </a:r>
+            <a:r>
+              <a:rPr lang="de-DE" sz="1400" b="0" dirty="0" smtClean="0">
+                <a:solidFill>
+                  <a:srgbClr val="000000"/>
+                </a:solidFill>
+                <a:latin typeface="+mn-lt"/>
+                <a:cs typeface="Arial" charset="0"/>
+              </a:rPr>
+              <a:t> </a:t>
+            </a:r>
+            <a:r>
+              <a:rPr lang="de-DE" sz="1400" b="0" dirty="0" err="1">
+                <a:solidFill>
+                  <a:srgbClr val="000000"/>
+                </a:solidFill>
+                <a:latin typeface="+mn-lt"/>
+                <a:cs typeface="Arial" charset="0"/>
+              </a:rPr>
+              <a:t>e</a:t>
+            </a:r>
+            <a:r>
+              <a:rPr lang="de-DE" sz="1400" b="0" dirty="0" err="1" smtClean="0">
+                <a:solidFill>
+                  <a:srgbClr val="000000"/>
+                </a:solidFill>
+                <a:latin typeface="+mn-lt"/>
+                <a:cs typeface="Arial" charset="0"/>
+              </a:rPr>
+              <a:t>dge</a:t>
+            </a:r>
+            <a:endParaRPr lang="de-DE" sz="1400" b="0" dirty="0">
               <a:solidFill>
                 <a:srgbClr val="000000"/>
               </a:solidFill>
-              <a:latin typeface="Arial" charset="0"/>
+              <a:latin typeface="+mn-lt"/>
               <a:cs typeface="Arial" charset="0"/>
             </a:endParaRPr>
           </a:p>
@@ -12988,7 +13318,7 @@
         </p:nvSpPr>
         <p:spPr bwMode="auto">
           <a:xfrm>
-            <a:off x="839820" y="1208572"/>
+            <a:off x="839820" y="1202531"/>
             <a:ext cx="646460" cy="255588"/>
           </a:xfrm>
           <a:prstGeom prst="rect">
@@ -13013,21 +13343,19 @@
               <a:defRPr/>
             </a:pPr>
             <a:r>
-              <a:rPr lang="en-US" sz="1200" b="1" dirty="0" smtClean="0">
+              <a:rPr lang="en-US" sz="1400" b="1" dirty="0" smtClean="0">
                 <a:solidFill>
                   <a:srgbClr val="000000"/>
                 </a:solidFill>
-                <a:latin typeface="Arial"/>
                 <a:ea typeface="+mn-ea"/>
                 <a:cs typeface="Arial"/>
               </a:rPr>
               <a:t>Legend</a:t>
             </a:r>
-            <a:endParaRPr lang="en-US" sz="1200" b="1" kern="0" dirty="0">
+            <a:endParaRPr lang="en-US" sz="1400" b="1" kern="0" dirty="0">
               <a:solidFill>
                 <a:srgbClr val="000000"/>
               </a:solidFill>
-              <a:latin typeface="Arial"/>
               <a:ea typeface="+mn-ea"/>
               <a:cs typeface="Arial"/>
             </a:endParaRPr>

</xml_diff>